<commit_message>
Implementazione from e tojson
</commit_message>
<xml_diff>
--- a/Progetto Gruppo 23.pptx
+++ b/Progetto Gruppo 23.pptx
@@ -11,6 +11,7 @@
     <p:sldId id="259" r:id="rId5"/>
     <p:sldId id="260" r:id="rId6"/>
     <p:sldId id="261" r:id="rId7"/>
+    <p:sldId id="262" r:id="rId8"/>
   </p:sldIdLst>
   <p:sldSz cx="12192000" cy="6858000"/>
   <p:notesSz cx="6858000" cy="9144000"/>
@@ -109,6 +110,11 @@
       </a:defRPr>
     </a:lvl9pPr>
   </p:defaultTextStyle>
+  <p:extLst>
+    <p:ext uri="{EFAFB233-063F-42B5-8137-9DF3F51BA10A}">
+      <p15:sldGuideLst xmlns:p15="http://schemas.microsoft.com/office/powerpoint/2012/main"/>
+    </p:ext>
+  </p:extLst>
 </p:presentation>
 </file>
 
@@ -259,7 +265,7 @@
           <a:p>
             <a:fld id="{8EF6E46B-FAAB-4F5D-AA00-056491096E6F}" type="datetimeFigureOut">
               <a:rPr lang="it-IT" smtClean="0"/>
-              <a:t>17/07/2025</a:t>
+              <a:t>20/08/2025</a:t>
             </a:fld>
             <a:endParaRPr lang="it-IT"/>
           </a:p>
@@ -457,7 +463,7 @@
           <a:p>
             <a:fld id="{8EF6E46B-FAAB-4F5D-AA00-056491096E6F}" type="datetimeFigureOut">
               <a:rPr lang="it-IT" smtClean="0"/>
-              <a:t>17/07/2025</a:t>
+              <a:t>20/08/2025</a:t>
             </a:fld>
             <a:endParaRPr lang="it-IT"/>
           </a:p>
@@ -665,7 +671,7 @@
           <a:p>
             <a:fld id="{8EF6E46B-FAAB-4F5D-AA00-056491096E6F}" type="datetimeFigureOut">
               <a:rPr lang="it-IT" smtClean="0"/>
-              <a:t>17/07/2025</a:t>
+              <a:t>20/08/2025</a:t>
             </a:fld>
             <a:endParaRPr lang="it-IT"/>
           </a:p>
@@ -863,7 +869,7 @@
           <a:p>
             <a:fld id="{8EF6E46B-FAAB-4F5D-AA00-056491096E6F}" type="datetimeFigureOut">
               <a:rPr lang="it-IT" smtClean="0"/>
-              <a:t>17/07/2025</a:t>
+              <a:t>20/08/2025</a:t>
             </a:fld>
             <a:endParaRPr lang="it-IT"/>
           </a:p>
@@ -1138,7 +1144,7 @@
           <a:p>
             <a:fld id="{8EF6E46B-FAAB-4F5D-AA00-056491096E6F}" type="datetimeFigureOut">
               <a:rPr lang="it-IT" smtClean="0"/>
-              <a:t>17/07/2025</a:t>
+              <a:t>20/08/2025</a:t>
             </a:fld>
             <a:endParaRPr lang="it-IT"/>
           </a:p>
@@ -1403,7 +1409,7 @@
           <a:p>
             <a:fld id="{8EF6E46B-FAAB-4F5D-AA00-056491096E6F}" type="datetimeFigureOut">
               <a:rPr lang="it-IT" smtClean="0"/>
-              <a:t>17/07/2025</a:t>
+              <a:t>20/08/2025</a:t>
             </a:fld>
             <a:endParaRPr lang="it-IT"/>
           </a:p>
@@ -1815,7 +1821,7 @@
           <a:p>
             <a:fld id="{8EF6E46B-FAAB-4F5D-AA00-056491096E6F}" type="datetimeFigureOut">
               <a:rPr lang="it-IT" smtClean="0"/>
-              <a:t>17/07/2025</a:t>
+              <a:t>20/08/2025</a:t>
             </a:fld>
             <a:endParaRPr lang="it-IT"/>
           </a:p>
@@ -1956,7 +1962,7 @@
           <a:p>
             <a:fld id="{8EF6E46B-FAAB-4F5D-AA00-056491096E6F}" type="datetimeFigureOut">
               <a:rPr lang="it-IT" smtClean="0"/>
-              <a:t>17/07/2025</a:t>
+              <a:t>20/08/2025</a:t>
             </a:fld>
             <a:endParaRPr lang="it-IT"/>
           </a:p>
@@ -2069,7 +2075,7 @@
           <a:p>
             <a:fld id="{8EF6E46B-FAAB-4F5D-AA00-056491096E6F}" type="datetimeFigureOut">
               <a:rPr lang="it-IT" smtClean="0"/>
-              <a:t>17/07/2025</a:t>
+              <a:t>20/08/2025</a:t>
             </a:fld>
             <a:endParaRPr lang="it-IT"/>
           </a:p>
@@ -2380,7 +2386,7 @@
           <a:p>
             <a:fld id="{8EF6E46B-FAAB-4F5D-AA00-056491096E6F}" type="datetimeFigureOut">
               <a:rPr lang="it-IT" smtClean="0"/>
-              <a:t>17/07/2025</a:t>
+              <a:t>20/08/2025</a:t>
             </a:fld>
             <a:endParaRPr lang="it-IT"/>
           </a:p>
@@ -2668,7 +2674,7 @@
           <a:p>
             <a:fld id="{8EF6E46B-FAAB-4F5D-AA00-056491096E6F}" type="datetimeFigureOut">
               <a:rPr lang="it-IT" smtClean="0"/>
-              <a:t>17/07/2025</a:t>
+              <a:t>20/08/2025</a:t>
             </a:fld>
             <a:endParaRPr lang="it-IT"/>
           </a:p>
@@ -2912,7 +2918,7 @@
           <a:p>
             <a:fld id="{8EF6E46B-FAAB-4F5D-AA00-056491096E6F}" type="datetimeFigureOut">
               <a:rPr lang="it-IT" smtClean="0"/>
-              <a:t>17/07/2025</a:t>
+              <a:t>20/08/2025</a:t>
             </a:fld>
             <a:endParaRPr lang="it-IT"/>
           </a:p>
@@ -4487,7 +4493,7 @@
         </p:spPr>
         <p:txBody>
           <a:bodyPr vert="horz" lIns="91440" tIns="45720" rIns="91440" bIns="45720" rtlCol="0" anchor="t">
-            <a:normAutofit lnSpcReduction="10000"/>
+            <a:normAutofit/>
           </a:bodyPr>
           <a:lstStyle>
             <a:lvl1pPr algn="l" defTabSz="914400" rtl="0" eaLnBrk="1" latinLnBrk="0" hangingPunct="1">
@@ -4525,7 +4531,7 @@
                 </a:effectLst>
                 <a:latin typeface="Century Schoolbook" panose="02040604050505020304" pitchFamily="18" charset="0"/>
               </a:rPr>
-              <a:t>La schermata admin offre la possibilità di caricare localmente un numero di testi, impostarne un livello di difficoltà e le stopword, confermato verrà generato da esso tramite Stream API una matrice di valori quali, testo, parole e le relative frequenze, difficoltà e lingua, ottenuti dal filtraggio del testo tramite le impostazioni selezionate</a:t>
+              <a:t>La schermata admin offre la possibilità di caricare localmente un numero di testi, impostarne livello di difficoltà e lingua, confermato verrà generato da esso tramite Stream API una matrice di valori che riguardano le informazioni di ogni testo, oltre che salvarne il testo integrale in uno specifico documento di testo.</a:t>
             </a:r>
           </a:p>
         </p:txBody>
@@ -4763,10 +4769,180 @@
                 </a:effectLst>
                 <a:latin typeface="Century Schoolbook" panose="02040604050505020304" pitchFamily="18" charset="0"/>
               </a:rPr>
-              <a:t>, il tempo scaduto esattamente come l’invio di una risposta permette di inviare all’oggetto delle domande del quiz, la risposta attualmente generata, che sarà confrontata con la risposta corretta generata già alla creazione </a:t>
-            </a:r>
-            <a:r>
-              <a:rPr lang="it-IT" sz="3200" b="1">
+              <a:t>, il tempo scaduto esattamente come l’invio di una risposta permette di inviare all’oggetto delle domande del quiz, la risposta attualmente generata, che sarà confrontata con la risposta corretta generata già alla creazione dell’oggetto domanda.</a:t>
+            </a:r>
+          </a:p>
+        </p:txBody>
+      </p:sp>
+    </p:spTree>
+    <p:extLst>
+      <p:ext uri="{BB962C8B-B14F-4D97-AF65-F5344CB8AC3E}">
+        <p14:creationId xmlns:p14="http://schemas.microsoft.com/office/powerpoint/2010/main" val="3036057837"/>
+      </p:ext>
+    </p:extLst>
+  </p:cSld>
+  <p:clrMapOvr>
+    <a:masterClrMapping/>
+  </p:clrMapOvr>
+</p:sld>
+</file>
+
+<file path=ppt/slides/slide7.xml><?xml version="1.0" encoding="utf-8"?>
+<p:sld xmlns:a="http://schemas.openxmlformats.org/drawingml/2006/main" xmlns:r="http://schemas.openxmlformats.org/officeDocument/2006/relationships" xmlns:p="http://schemas.openxmlformats.org/presentationml/2006/main">
+  <p:cSld>
+    <p:spTree>
+      <p:nvGrpSpPr>
+        <p:cNvPr id="1" name="">
+          <a:extLst>
+            <a:ext uri="{FF2B5EF4-FFF2-40B4-BE49-F238E27FC236}">
+              <a16:creationId xmlns:a16="http://schemas.microsoft.com/office/drawing/2014/main" id="{976B7341-8CD3-3E13-95BB-392C40A59D1F}"/>
+            </a:ext>
+          </a:extLst>
+        </p:cNvPr>
+        <p:cNvGrpSpPr/>
+        <p:nvPr/>
+      </p:nvGrpSpPr>
+      <p:grpSpPr>
+        <a:xfrm>
+          <a:off x="0" y="0"/>
+          <a:ext cx="0" cy="0"/>
+          <a:chOff x="0" y="0"/>
+          <a:chExt cx="0" cy="0"/>
+        </a:xfrm>
+      </p:grpSpPr>
+      <p:sp>
+        <p:nvSpPr>
+          <p:cNvPr id="4" name="Titolo 3">
+            <a:extLst>
+              <a:ext uri="{FF2B5EF4-FFF2-40B4-BE49-F238E27FC236}">
+                <a16:creationId xmlns:a16="http://schemas.microsoft.com/office/drawing/2014/main" id="{9FC2C65D-7D1F-593C-7483-87999D84B8F7}"/>
+              </a:ext>
+            </a:extLst>
+          </p:cNvPr>
+          <p:cNvSpPr txBox="1">
+            <a:spLocks/>
+          </p:cNvSpPr>
+          <p:nvPr/>
+        </p:nvSpPr>
+        <p:spPr>
+          <a:xfrm>
+            <a:off x="464916" y="435994"/>
+            <a:ext cx="10230092" cy="841065"/>
+          </a:xfrm>
+          <a:prstGeom prst="rect">
+            <a:avLst/>
+          </a:prstGeom>
+        </p:spPr>
+        <p:txBody>
+          <a:bodyPr vert="horz" lIns="91440" tIns="45720" rIns="91440" bIns="45720" rtlCol="0" anchor="ctr">
+            <a:normAutofit fontScale="92500" lnSpcReduction="10000"/>
+          </a:bodyPr>
+          <a:lstStyle>
+            <a:lvl1pPr algn="l" defTabSz="914400" rtl="0" eaLnBrk="1" latinLnBrk="0" hangingPunct="1">
+              <a:lnSpc>
+                <a:spcPct val="90000"/>
+              </a:lnSpc>
+              <a:spcBef>
+                <a:spcPct val="0"/>
+              </a:spcBef>
+              <a:buNone/>
+              <a:defRPr sz="4400" kern="1200">
+                <a:solidFill>
+                  <a:schemeClr val="tx1"/>
+                </a:solidFill>
+                <a:latin typeface="+mj-lt"/>
+                <a:ea typeface="+mj-ea"/>
+                <a:cs typeface="+mj-cs"/>
+              </a:defRPr>
+            </a:lvl1pPr>
+          </a:lstStyle>
+          <a:p>
+            <a:r>
+              <a:rPr lang="it-IT" sz="6000" dirty="0">
+                <a:solidFill>
+                  <a:srgbClr val="8114FF"/>
+                </a:solidFill>
+                <a:effectLst>
+                  <a:outerShdw blurRad="50800" dist="38100" dir="2700000" algn="tl" rotWithShape="0">
+                    <a:prstClr val="black">
+                      <a:alpha val="40000"/>
+                    </a:prstClr>
+                  </a:outerShdw>
+                </a:effectLst>
+                <a:latin typeface="Augusta" panose="02000503020000020003" pitchFamily="2" charset="0"/>
+              </a:rPr>
+              <a:t>Schermata </a:t>
+            </a:r>
+            <a:r>
+              <a:rPr lang="it-IT" sz="6000" dirty="0">
+                <a:effectLst>
+                  <a:outerShdw blurRad="50800" dist="38100" dir="2700000" algn="tl" rotWithShape="0">
+                    <a:prstClr val="black">
+                      <a:alpha val="40000"/>
+                    </a:prstClr>
+                  </a:outerShdw>
+                </a:effectLst>
+                <a:latin typeface="Augusta" panose="02000503020000020003" pitchFamily="2" charset="0"/>
+              </a:rPr>
+              <a:t>Risultati</a:t>
+            </a:r>
+          </a:p>
+        </p:txBody>
+      </p:sp>
+      <p:sp>
+        <p:nvSpPr>
+          <p:cNvPr id="5" name="Titolo 3">
+            <a:extLst>
+              <a:ext uri="{FF2B5EF4-FFF2-40B4-BE49-F238E27FC236}">
+                <a16:creationId xmlns:a16="http://schemas.microsoft.com/office/drawing/2014/main" id="{93F6B91D-A6AD-BD4F-9A96-E877616528A7}"/>
+              </a:ext>
+            </a:extLst>
+          </p:cNvPr>
+          <p:cNvSpPr txBox="1">
+            <a:spLocks/>
+          </p:cNvSpPr>
+          <p:nvPr/>
+        </p:nvSpPr>
+        <p:spPr>
+          <a:xfrm>
+            <a:off x="464916" y="1277059"/>
+            <a:ext cx="6896583" cy="5144947"/>
+          </a:xfrm>
+          <a:prstGeom prst="rect">
+            <a:avLst/>
+          </a:prstGeom>
+        </p:spPr>
+        <p:txBody>
+          <a:bodyPr vert="horz" lIns="91440" tIns="45720" rIns="91440" bIns="45720" rtlCol="0" anchor="t">
+            <a:normAutofit/>
+          </a:bodyPr>
+          <a:lstStyle>
+            <a:lvl1pPr algn="l" defTabSz="914400" rtl="0" eaLnBrk="1" latinLnBrk="0" hangingPunct="1">
+              <a:lnSpc>
+                <a:spcPct val="90000"/>
+              </a:lnSpc>
+              <a:spcBef>
+                <a:spcPct val="0"/>
+              </a:spcBef>
+              <a:buNone/>
+              <a:defRPr sz="4400" kern="1200">
+                <a:solidFill>
+                  <a:schemeClr val="tx1"/>
+                </a:solidFill>
+                <a:latin typeface="+mj-lt"/>
+                <a:ea typeface="+mj-ea"/>
+                <a:cs typeface="+mj-cs"/>
+              </a:defRPr>
+            </a:lvl1pPr>
+          </a:lstStyle>
+          <a:p>
+            <a:pPr algn="just">
+              <a:lnSpc>
+                <a:spcPct val="110000"/>
+              </a:lnSpc>
+            </a:pPr>
+            <a:r>
+              <a:rPr lang="it-IT" sz="2800" b="1" dirty="0">
                 <a:effectLst>
                   <a:outerShdw blurRad="50800" dist="38100" dir="2700000" algn="tl" rotWithShape="0">
                     <a:prstClr val="black">
@@ -4776,25 +4952,35 @@
                 </a:effectLst>
                 <a:latin typeface="Century Schoolbook" panose="02040604050505020304" pitchFamily="18" charset="0"/>
               </a:rPr>
-              <a:t>dell’oggetto domanda.</a:t>
-            </a:r>
-            <a:endParaRPr lang="it-IT" sz="3200" b="1" dirty="0">
-              <a:effectLst>
-                <a:outerShdw blurRad="50800" dist="38100" dir="2700000" algn="tl" rotWithShape="0">
-                  <a:prstClr val="black">
-                    <a:alpha val="40000"/>
-                  </a:prstClr>
-                </a:outerShdw>
-              </a:effectLst>
-              <a:latin typeface="Century Schoolbook" panose="02040604050505020304" pitchFamily="18" charset="0"/>
-            </a:endParaRPr>
+              <a:t>La schermata classifica utilizza la lista di domande generata durante la fase di gioco ed i valori di punteggio che sono stati salvati per ognuna delle domande e li mostra a schermo, con testo, risposta data e risposta esatta.</a:t>
+            </a:r>
+          </a:p>
+          <a:p>
+            <a:pPr algn="just">
+              <a:lnSpc>
+                <a:spcPct val="110000"/>
+              </a:lnSpc>
+            </a:pPr>
+            <a:r>
+              <a:rPr lang="it-IT" sz="2800" b="1" dirty="0">
+                <a:effectLst>
+                  <a:outerShdw blurRad="50800" dist="38100" dir="2700000" algn="tl" rotWithShape="0">
+                    <a:prstClr val="black">
+                      <a:alpha val="40000"/>
+                    </a:prstClr>
+                  </a:outerShdw>
+                </a:effectLst>
+                <a:latin typeface="Century Schoolbook" panose="02040604050505020304" pitchFamily="18" charset="0"/>
+              </a:rPr>
+              <a:t>Dopo questo resoconto è possibile concludere la partita e tornare al menù.</a:t>
+            </a:r>
           </a:p>
         </p:txBody>
       </p:sp>
     </p:spTree>
     <p:extLst>
       <p:ext uri="{BB962C8B-B14F-4D97-AF65-F5344CB8AC3E}">
-        <p14:creationId xmlns:p14="http://schemas.microsoft.com/office/powerpoint/2010/main" val="3036057837"/>
+        <p14:creationId xmlns:p14="http://schemas.microsoft.com/office/powerpoint/2010/main" val="1388126292"/>
       </p:ext>
     </p:extLst>
   </p:cSld>

</xml_diff>